<commit_message>
moved images around and updated icons, completed front desk course
</commit_message>
<xml_diff>
--- a/ActiveNet Trainer/Courses/All Encompassing/Splash Screens.pptx
+++ b/ActiveNet Trainer/Courses/All Encompassing/Splash Screens.pptx
@@ -9,6 +9,7 @@
     <p:sldId id="260" r:id="rId3"/>
     <p:sldId id="261" r:id="rId4"/>
     <p:sldId id="262" r:id="rId5"/>
+    <p:sldId id="263" r:id="rId6"/>
   </p:sldIdLst>
   <p:sldSz cx="9144000" cy="6858000" type="screen4x3"/>
   <p:notesSz cx="6858000" cy="9144000"/>
@@ -246,7 +247,7 @@
           <a:p>
             <a:fld id="{8472C7DE-940F-F84D-87FC-CB6C77FFB87A}" type="datetimeFigureOut">
               <a:rPr lang="en-US" smtClean="0"/>
-              <a:t>12/21/16</a:t>
+              <a:t>1/18/17</a:t>
             </a:fld>
             <a:endParaRPr lang="en-US"/>
           </a:p>
@@ -416,7 +417,7 @@
           <a:p>
             <a:fld id="{8472C7DE-940F-F84D-87FC-CB6C77FFB87A}" type="datetimeFigureOut">
               <a:rPr lang="en-US" smtClean="0"/>
-              <a:t>12/21/16</a:t>
+              <a:t>1/18/17</a:t>
             </a:fld>
             <a:endParaRPr lang="en-US"/>
           </a:p>
@@ -596,7 +597,7 @@
           <a:p>
             <a:fld id="{8472C7DE-940F-F84D-87FC-CB6C77FFB87A}" type="datetimeFigureOut">
               <a:rPr lang="en-US" smtClean="0"/>
-              <a:t>12/21/16</a:t>
+              <a:t>1/18/17</a:t>
             </a:fld>
             <a:endParaRPr lang="en-US"/>
           </a:p>
@@ -766,7 +767,7 @@
           <a:p>
             <a:fld id="{8472C7DE-940F-F84D-87FC-CB6C77FFB87A}" type="datetimeFigureOut">
               <a:rPr lang="en-US" smtClean="0"/>
-              <a:t>12/21/16</a:t>
+              <a:t>1/18/17</a:t>
             </a:fld>
             <a:endParaRPr lang="en-US"/>
           </a:p>
@@ -1010,7 +1011,7 @@
           <a:p>
             <a:fld id="{8472C7DE-940F-F84D-87FC-CB6C77FFB87A}" type="datetimeFigureOut">
               <a:rPr lang="en-US" smtClean="0"/>
-              <a:t>12/21/16</a:t>
+              <a:t>1/18/17</a:t>
             </a:fld>
             <a:endParaRPr lang="en-US"/>
           </a:p>
@@ -1242,7 +1243,7 @@
           <a:p>
             <a:fld id="{8472C7DE-940F-F84D-87FC-CB6C77FFB87A}" type="datetimeFigureOut">
               <a:rPr lang="en-US" smtClean="0"/>
-              <a:t>12/21/16</a:t>
+              <a:t>1/18/17</a:t>
             </a:fld>
             <a:endParaRPr lang="en-US"/>
           </a:p>
@@ -1609,7 +1610,7 @@
           <a:p>
             <a:fld id="{8472C7DE-940F-F84D-87FC-CB6C77FFB87A}" type="datetimeFigureOut">
               <a:rPr lang="en-US" smtClean="0"/>
-              <a:t>12/21/16</a:t>
+              <a:t>1/18/17</a:t>
             </a:fld>
             <a:endParaRPr lang="en-US"/>
           </a:p>
@@ -1727,7 +1728,7 @@
           <a:p>
             <a:fld id="{8472C7DE-940F-F84D-87FC-CB6C77FFB87A}" type="datetimeFigureOut">
               <a:rPr lang="en-US" smtClean="0"/>
-              <a:t>12/21/16</a:t>
+              <a:t>1/18/17</a:t>
             </a:fld>
             <a:endParaRPr lang="en-US"/>
           </a:p>
@@ -1822,7 +1823,7 @@
           <a:p>
             <a:fld id="{8472C7DE-940F-F84D-87FC-CB6C77FFB87A}" type="datetimeFigureOut">
               <a:rPr lang="en-US" smtClean="0"/>
-              <a:t>12/21/16</a:t>
+              <a:t>1/18/17</a:t>
             </a:fld>
             <a:endParaRPr lang="en-US"/>
           </a:p>
@@ -2099,7 +2100,7 @@
           <a:p>
             <a:fld id="{8472C7DE-940F-F84D-87FC-CB6C77FFB87A}" type="datetimeFigureOut">
               <a:rPr lang="en-US" smtClean="0"/>
-              <a:t>12/21/16</a:t>
+              <a:t>1/18/17</a:t>
             </a:fld>
             <a:endParaRPr lang="en-US"/>
           </a:p>
@@ -2356,7 +2357,7 @@
           <a:p>
             <a:fld id="{8472C7DE-940F-F84D-87FC-CB6C77FFB87A}" type="datetimeFigureOut">
               <a:rPr lang="en-US" smtClean="0"/>
-              <a:t>12/21/16</a:t>
+              <a:t>1/18/17</a:t>
             </a:fld>
             <a:endParaRPr lang="en-US"/>
           </a:p>
@@ -2569,7 +2570,7 @@
           <a:p>
             <a:fld id="{8472C7DE-940F-F84D-87FC-CB6C77FFB87A}" type="datetimeFigureOut">
               <a:rPr lang="en-US" smtClean="0"/>
-              <a:t>12/21/16</a:t>
+              <a:t>1/18/17</a:t>
             </a:fld>
             <a:endParaRPr lang="en-US"/>
           </a:p>
@@ -3991,6 +3992,253 @@
 </p:sld>
 </file>
 
+<file path=ppt/slides/slide5.xml><?xml version="1.0" encoding="utf-8"?>
+<p:sld xmlns:a="http://schemas.openxmlformats.org/drawingml/2006/main" xmlns:r="http://schemas.openxmlformats.org/officeDocument/2006/relationships" xmlns:p="http://schemas.openxmlformats.org/presentationml/2006/main">
+  <p:cSld>
+    <p:spTree>
+      <p:nvGrpSpPr>
+        <p:cNvPr id="1" name=""/>
+        <p:cNvGrpSpPr/>
+        <p:nvPr/>
+      </p:nvGrpSpPr>
+      <p:grpSpPr>
+        <a:xfrm>
+          <a:off x="0" y="0"/>
+          <a:ext cx="0" cy="0"/>
+          <a:chOff x="0" y="0"/>
+          <a:chExt cx="0" cy="0"/>
+        </a:xfrm>
+      </p:grpSpPr>
+      <p:sp>
+        <p:nvSpPr>
+          <p:cNvPr id="5" name="TextBox 4"/>
+          <p:cNvSpPr txBox="1"/>
+          <p:nvPr/>
+        </p:nvSpPr>
+        <p:spPr>
+          <a:xfrm>
+            <a:off x="2205990" y="6394483"/>
+            <a:ext cx="6526530" cy="307777"/>
+          </a:xfrm>
+          <a:prstGeom prst="rect">
+            <a:avLst/>
+          </a:prstGeom>
+          <a:noFill/>
+        </p:spPr>
+        <p:txBody>
+          <a:bodyPr wrap="square" rtlCol="0">
+            <a:spAutoFit/>
+          </a:bodyPr>
+          <a:lstStyle/>
+          <a:p>
+            <a:r>
+              <a:rPr lang="en-US" sz="1400" dirty="0" smtClean="0">
+                <a:solidFill>
+                  <a:schemeClr val="bg1"/>
+                </a:solidFill>
+              </a:rPr>
+              <a:t>Sub Instruction Here</a:t>
+            </a:r>
+            <a:endParaRPr lang="en-US" sz="1400" dirty="0">
+              <a:solidFill>
+                <a:schemeClr val="bg1"/>
+              </a:solidFill>
+            </a:endParaRPr>
+          </a:p>
+        </p:txBody>
+      </p:sp>
+      <p:pic>
+        <p:nvPicPr>
+          <p:cNvPr id="4" name="Picture 3"/>
+          <p:cNvPicPr>
+            <a:picLocks noChangeAspect="1"/>
+          </p:cNvPicPr>
+          <p:nvPr/>
+        </p:nvPicPr>
+        <p:blipFill>
+          <a:blip r:embed="rId2">
+            <a:extLst>
+              <a:ext uri="{28A0092B-C50C-407E-A947-70E740481C1C}">
+                <a14:useLocalDpi xmlns:a14="http://schemas.microsoft.com/office/drawing/2010/main" val="0"/>
+              </a:ext>
+            </a:extLst>
+          </a:blip>
+          <a:stretch>
+            <a:fillRect/>
+          </a:stretch>
+        </p:blipFill>
+        <p:spPr>
+          <a:xfrm>
+            <a:off x="-9626" y="5577774"/>
+            <a:ext cx="9153625" cy="1318726"/>
+          </a:xfrm>
+          <a:prstGeom prst="rect">
+            <a:avLst/>
+          </a:prstGeom>
+        </p:spPr>
+      </p:pic>
+      <p:pic>
+        <p:nvPicPr>
+          <p:cNvPr id="2" name="Picture 1"/>
+          <p:cNvPicPr>
+            <a:picLocks noChangeAspect="1"/>
+          </p:cNvPicPr>
+          <p:nvPr/>
+        </p:nvPicPr>
+        <p:blipFill>
+          <a:blip r:embed="rId3">
+            <a:extLst>
+              <a:ext uri="{28A0092B-C50C-407E-A947-70E740481C1C}">
+                <a14:useLocalDpi xmlns:a14="http://schemas.microsoft.com/office/drawing/2010/main" val="0"/>
+              </a:ext>
+            </a:extLst>
+          </a:blip>
+          <a:stretch>
+            <a:fillRect/>
+          </a:stretch>
+        </p:blipFill>
+        <p:spPr>
+          <a:xfrm>
+            <a:off x="-13252" y="-17793"/>
+            <a:ext cx="9144000" cy="1237129"/>
+          </a:xfrm>
+          <a:prstGeom prst="rect">
+            <a:avLst/>
+          </a:prstGeom>
+        </p:spPr>
+      </p:pic>
+      <p:sp>
+        <p:nvSpPr>
+          <p:cNvPr id="7" name="Oval 6"/>
+          <p:cNvSpPr/>
+          <p:nvPr/>
+        </p:nvSpPr>
+        <p:spPr>
+          <a:xfrm>
+            <a:off x="3294159" y="1327521"/>
+            <a:ext cx="2514600" cy="2514600"/>
+          </a:xfrm>
+          <a:prstGeom prst="ellipse">
+            <a:avLst/>
+          </a:prstGeom>
+          <a:solidFill>
+            <a:srgbClr val="000046"/>
+          </a:solidFill>
+          <a:ln w="76200">
+            <a:solidFill>
+              <a:schemeClr val="bg1"/>
+            </a:solidFill>
+          </a:ln>
+          <a:effectLst>
+            <a:outerShdw blurRad="50800" dist="76200" dir="2700000" algn="tl" rotWithShape="0">
+              <a:prstClr val="black">
+                <a:alpha val="40000"/>
+              </a:prstClr>
+            </a:outerShdw>
+          </a:effectLst>
+        </p:spPr>
+        <p:style>
+          <a:lnRef idx="2">
+            <a:schemeClr val="accent1">
+              <a:shade val="50000"/>
+            </a:schemeClr>
+          </a:lnRef>
+          <a:fillRef idx="1">
+            <a:schemeClr val="accent1"/>
+          </a:fillRef>
+          <a:effectRef idx="0">
+            <a:schemeClr val="accent1"/>
+          </a:effectRef>
+          <a:fontRef idx="minor">
+            <a:schemeClr val="lt1"/>
+          </a:fontRef>
+        </p:style>
+        <p:txBody>
+          <a:bodyPr lIns="0" rIns="0" rtlCol="0" anchor="ctr"/>
+          <a:lstStyle/>
+          <a:p>
+            <a:pPr algn="ctr"/>
+            <a:r>
+              <a:rPr lang="en-US" sz="2800" b="1" dirty="0" smtClean="0"/>
+              <a:t>Cash Receipts</a:t>
+            </a:r>
+            <a:endParaRPr lang="en-US" sz="2800" b="1" dirty="0"/>
+          </a:p>
+        </p:txBody>
+      </p:sp>
+      <p:sp>
+        <p:nvSpPr>
+          <p:cNvPr id="8" name="TextBox 7"/>
+          <p:cNvSpPr txBox="1"/>
+          <p:nvPr/>
+        </p:nvSpPr>
+        <p:spPr>
+          <a:xfrm>
+            <a:off x="187011" y="4125172"/>
+            <a:ext cx="8760350" cy="1384995"/>
+          </a:xfrm>
+          <a:prstGeom prst="rect">
+            <a:avLst/>
+          </a:prstGeom>
+          <a:noFill/>
+        </p:spPr>
+        <p:txBody>
+          <a:bodyPr wrap="square" rtlCol="0">
+            <a:spAutoFit/>
+          </a:bodyPr>
+          <a:lstStyle/>
+          <a:p>
+            <a:pPr algn="ctr"/>
+            <a:r>
+              <a:rPr lang="en-US" sz="1400" dirty="0" smtClean="0"/>
+              <a:t>Cash Receipt Reports must be run on a daily basis.</a:t>
+            </a:r>
+          </a:p>
+          <a:p>
+            <a:pPr algn="ctr"/>
+            <a:endParaRPr lang="en-US" sz="1400" dirty="0"/>
+          </a:p>
+          <a:p>
+            <a:pPr algn="ctr"/>
+            <a:r>
+              <a:rPr lang="en-US" sz="1400" dirty="0" smtClean="0"/>
+              <a:t>Each facility that allows registration, reservations or memberships need to run this report at the end of every business day to promise all of the day’s transactions were accounted for.</a:t>
+            </a:r>
+          </a:p>
+          <a:p>
+            <a:pPr algn="ctr"/>
+            <a:endParaRPr lang="en-US" sz="1400" dirty="0"/>
+          </a:p>
+          <a:p>
+            <a:pPr algn="ctr"/>
+            <a:r>
+              <a:rPr lang="en-US" sz="1400" dirty="0" smtClean="0"/>
+              <a:t>If you have any issues during this process, please ask your direct supervisor for assistance.</a:t>
+            </a:r>
+            <a:endParaRPr lang="en-US" sz="1400" dirty="0"/>
+          </a:p>
+        </p:txBody>
+      </p:sp>
+    </p:spTree>
+    <p:extLst>
+      <p:ext uri="{BB962C8B-B14F-4D97-AF65-F5344CB8AC3E}">
+        <p14:creationId xmlns:p14="http://schemas.microsoft.com/office/powerpoint/2010/main" val="1847663842"/>
+      </p:ext>
+    </p:extLst>
+  </p:cSld>
+  <p:clrMapOvr>
+    <a:masterClrMapping/>
+  </p:clrMapOvr>
+  <p:timing>
+    <p:tnLst>
+      <p:par>
+        <p:cTn id="1" dur="indefinite" restart="never" nodeType="tmRoot"/>
+      </p:par>
+    </p:tnLst>
+  </p:timing>
+</p:sld>
+</file>
+
 <file path=ppt/theme/theme1.xml><?xml version="1.0" encoding="utf-8"?>
 <a:theme xmlns:a="http://schemas.openxmlformats.org/drawingml/2006/main" name="Office Theme">
   <a:themeElements>

</xml_diff>